<commit_message>
updates some image copyrights
</commit_message>
<xml_diff>
--- a/Close Reading.pptx
+++ b/Close Reading.pptx
@@ -205,7 +205,7 @@
           <a:p>
             <a:fld id="{1D7381C4-F394-8E4D-9719-28DB5CC2A9BA}" type="datetimeFigureOut">
               <a:rPr lang="en-US" smtClean="0"/>
-              <a:t>9/21/16</a:t>
+              <a:t>10/7/16</a:t>
             </a:fld>
             <a:endParaRPr lang="en-US"/>
           </a:p>
@@ -517,6 +517,37 @@
           <a:bodyPr/>
           <a:lstStyle/>
           <a:p>
+            <a:r>
+              <a:rPr lang="en-US" dirty="0" err="1" smtClean="0"/>
+              <a:t>Weisstein</a:t>
+            </a:r>
+            <a:r>
+              <a:rPr lang="en-US" dirty="0" smtClean="0"/>
+              <a:t>, Eric W. "Rabbit-Duck Illusion." From </a:t>
+            </a:r>
+            <a:r>
+              <a:rPr lang="en-US" dirty="0" err="1" smtClean="0"/>
+              <a:t>MathWorld</a:t>
+            </a:r>
+            <a:r>
+              <a:rPr lang="en-US" dirty="0" smtClean="0"/>
+              <a:t>--A Wolfram Web Resource. http://</a:t>
+            </a:r>
+            <a:r>
+              <a:rPr lang="en-US" dirty="0" err="1" smtClean="0"/>
+              <a:t>mathworld.wolfram.com</a:t>
+            </a:r>
+            <a:r>
+              <a:rPr lang="en-US" dirty="0" smtClean="0"/>
+              <a:t>/Rabbit-</a:t>
+            </a:r>
+            <a:r>
+              <a:rPr lang="en-US" dirty="0" err="1" smtClean="0"/>
+              <a:t>DuckIllusion.html</a:t>
+            </a:r>
+            <a:endParaRPr lang="en-US" smtClean="0"/>
+          </a:p>
+          <a:p>
             <a:endParaRPr lang="en-US" dirty="0"/>
           </a:p>
         </p:txBody>
@@ -538,7 +569,7 @@
           <a:p>
             <a:fld id="{80AFF2F4-E62F-6F47-BEC3-87F8D59DE432}" type="slidenum">
               <a:rPr lang="en-US" smtClean="0"/>
-              <a:t>8</a:t>
+              <a:t>5</a:t>
             </a:fld>
             <a:endParaRPr lang="en-US"/>
           </a:p>
@@ -547,7 +578,7 @@
     </p:spTree>
     <p:extLst>
       <p:ext uri="{BB962C8B-B14F-4D97-AF65-F5344CB8AC3E}">
-        <p14:creationId xmlns:p14="http://schemas.microsoft.com/office/powerpoint/2010/main" val="3472569865"/>
+        <p14:creationId xmlns:p14="http://schemas.microsoft.com/office/powerpoint/2010/main" val="351457365"/>
       </p:ext>
     </p:extLst>
   </p:cSld>
@@ -622,7 +653,7 @@
           <a:p>
             <a:fld id="{80AFF2F4-E62F-6F47-BEC3-87F8D59DE432}" type="slidenum">
               <a:rPr lang="en-US" smtClean="0"/>
-              <a:t>12</a:t>
+              <a:t>8</a:t>
             </a:fld>
             <a:endParaRPr lang="en-US"/>
           </a:p>
@@ -685,6 +716,90 @@
           <a:bodyPr/>
           <a:lstStyle/>
           <a:p>
+            <a:endParaRPr lang="en-US" dirty="0"/>
+          </a:p>
+        </p:txBody>
+      </p:sp>
+      <p:sp>
+        <p:nvSpPr>
+          <p:cNvPr id="4" name="Slide Number Placeholder 3"/>
+          <p:cNvSpPr>
+            <a:spLocks noGrp="1"/>
+          </p:cNvSpPr>
+          <p:nvPr>
+            <p:ph type="sldNum" sz="quarter" idx="10"/>
+          </p:nvPr>
+        </p:nvSpPr>
+        <p:spPr/>
+        <p:txBody>
+          <a:bodyPr/>
+          <a:lstStyle/>
+          <a:p>
+            <a:fld id="{80AFF2F4-E62F-6F47-BEC3-87F8D59DE432}" type="slidenum">
+              <a:rPr lang="en-US" smtClean="0"/>
+              <a:t>12</a:t>
+            </a:fld>
+            <a:endParaRPr lang="en-US"/>
+          </a:p>
+        </p:txBody>
+      </p:sp>
+    </p:spTree>
+    <p:extLst>
+      <p:ext uri="{BB962C8B-B14F-4D97-AF65-F5344CB8AC3E}">
+        <p14:creationId xmlns:p14="http://schemas.microsoft.com/office/powerpoint/2010/main" val="3472569865"/>
+      </p:ext>
+    </p:extLst>
+  </p:cSld>
+  <p:clrMapOvr>
+    <a:masterClrMapping/>
+  </p:clrMapOvr>
+</p:notes>
+</file>
+
+<file path=ppt/notesSlides/notesSlide4.xml><?xml version="1.0" encoding="utf-8"?>
+<p:notes xmlns:a="http://schemas.openxmlformats.org/drawingml/2006/main" xmlns:r="http://schemas.openxmlformats.org/officeDocument/2006/relationships" xmlns:p="http://schemas.openxmlformats.org/presentationml/2006/main">
+  <p:cSld>
+    <p:spTree>
+      <p:nvGrpSpPr>
+        <p:cNvPr id="1" name=""/>
+        <p:cNvGrpSpPr/>
+        <p:nvPr/>
+      </p:nvGrpSpPr>
+      <p:grpSpPr>
+        <a:xfrm>
+          <a:off x="0" y="0"/>
+          <a:ext cx="0" cy="0"/>
+          <a:chOff x="0" y="0"/>
+          <a:chExt cx="0" cy="0"/>
+        </a:xfrm>
+      </p:grpSpPr>
+      <p:sp>
+        <p:nvSpPr>
+          <p:cNvPr id="2" name="Slide Image Placeholder 1"/>
+          <p:cNvSpPr>
+            <a:spLocks noGrp="1" noRot="1" noChangeAspect="1"/>
+          </p:cNvSpPr>
+          <p:nvPr>
+            <p:ph type="sldImg"/>
+          </p:nvPr>
+        </p:nvSpPr>
+        <p:spPr/>
+      </p:sp>
+      <p:sp>
+        <p:nvSpPr>
+          <p:cNvPr id="3" name="Notes Placeholder 2"/>
+          <p:cNvSpPr>
+            <a:spLocks noGrp="1"/>
+          </p:cNvSpPr>
+          <p:nvPr>
+            <p:ph type="body" idx="1"/>
+          </p:nvPr>
+        </p:nvSpPr>
+        <p:spPr/>
+        <p:txBody>
+          <a:bodyPr/>
+          <a:lstStyle/>
+          <a:p>
             <a:r>
               <a:rPr lang="en-US" dirty="0" smtClean="0"/>
               <a:t>The note that </a:t>
@@ -910,7 +1025,7 @@
           <a:p>
             <a:fld id="{CB79A789-FB6D-8243-8EF8-27BA8108C35C}" type="datetimeFigureOut">
               <a:rPr lang="en-US" smtClean="0"/>
-              <a:t>9/21/16</a:t>
+              <a:t>10/7/16</a:t>
             </a:fld>
             <a:endParaRPr lang="en-US"/>
           </a:p>
@@ -1080,7 +1195,7 @@
           <a:p>
             <a:fld id="{CB79A789-FB6D-8243-8EF8-27BA8108C35C}" type="datetimeFigureOut">
               <a:rPr lang="en-US" smtClean="0"/>
-              <a:t>9/21/16</a:t>
+              <a:t>10/7/16</a:t>
             </a:fld>
             <a:endParaRPr lang="en-US"/>
           </a:p>
@@ -1260,7 +1375,7 @@
           <a:p>
             <a:fld id="{CB79A789-FB6D-8243-8EF8-27BA8108C35C}" type="datetimeFigureOut">
               <a:rPr lang="en-US" smtClean="0"/>
-              <a:t>9/21/16</a:t>
+              <a:t>10/7/16</a:t>
             </a:fld>
             <a:endParaRPr lang="en-US"/>
           </a:p>
@@ -1430,7 +1545,7 @@
           <a:p>
             <a:fld id="{CB79A789-FB6D-8243-8EF8-27BA8108C35C}" type="datetimeFigureOut">
               <a:rPr lang="en-US" smtClean="0"/>
-              <a:t>9/21/16</a:t>
+              <a:t>10/7/16</a:t>
             </a:fld>
             <a:endParaRPr lang="en-US"/>
           </a:p>
@@ -1676,7 +1791,7 @@
           <a:p>
             <a:fld id="{CB79A789-FB6D-8243-8EF8-27BA8108C35C}" type="datetimeFigureOut">
               <a:rPr lang="en-US" smtClean="0"/>
-              <a:t>9/21/16</a:t>
+              <a:t>10/7/16</a:t>
             </a:fld>
             <a:endParaRPr lang="en-US"/>
           </a:p>
@@ -1964,7 +2079,7 @@
           <a:p>
             <a:fld id="{CB79A789-FB6D-8243-8EF8-27BA8108C35C}" type="datetimeFigureOut">
               <a:rPr lang="en-US" smtClean="0"/>
-              <a:t>9/21/16</a:t>
+              <a:t>10/7/16</a:t>
             </a:fld>
             <a:endParaRPr lang="en-US"/>
           </a:p>
@@ -2386,7 +2501,7 @@
           <a:p>
             <a:fld id="{CB79A789-FB6D-8243-8EF8-27BA8108C35C}" type="datetimeFigureOut">
               <a:rPr lang="en-US" smtClean="0"/>
-              <a:t>9/21/16</a:t>
+              <a:t>10/7/16</a:t>
             </a:fld>
             <a:endParaRPr lang="en-US"/>
           </a:p>
@@ -2504,7 +2619,7 @@
           <a:p>
             <a:fld id="{CB79A789-FB6D-8243-8EF8-27BA8108C35C}" type="datetimeFigureOut">
               <a:rPr lang="en-US" smtClean="0"/>
-              <a:t>9/21/16</a:t>
+              <a:t>10/7/16</a:t>
             </a:fld>
             <a:endParaRPr lang="en-US"/>
           </a:p>
@@ -2599,7 +2714,7 @@
           <a:p>
             <a:fld id="{CB79A789-FB6D-8243-8EF8-27BA8108C35C}" type="datetimeFigureOut">
               <a:rPr lang="en-US" smtClean="0"/>
-              <a:t>9/21/16</a:t>
+              <a:t>10/7/16</a:t>
             </a:fld>
             <a:endParaRPr lang="en-US"/>
           </a:p>
@@ -2876,7 +2991,7 @@
           <a:p>
             <a:fld id="{CB79A789-FB6D-8243-8EF8-27BA8108C35C}" type="datetimeFigureOut">
               <a:rPr lang="en-US" smtClean="0"/>
-              <a:t>9/21/16</a:t>
+              <a:t>10/7/16</a:t>
             </a:fld>
             <a:endParaRPr lang="en-US"/>
           </a:p>
@@ -3129,7 +3244,7 @@
           <a:p>
             <a:fld id="{CB79A789-FB6D-8243-8EF8-27BA8108C35C}" type="datetimeFigureOut">
               <a:rPr lang="en-US" smtClean="0"/>
-              <a:t>9/21/16</a:t>
+              <a:t>10/7/16</a:t>
             </a:fld>
             <a:endParaRPr lang="en-US"/>
           </a:p>
@@ -3342,7 +3457,7 @@
           <a:p>
             <a:fld id="{CB79A789-FB6D-8243-8EF8-27BA8108C35C}" type="datetimeFigureOut">
               <a:rPr lang="en-US" smtClean="0"/>
-              <a:t>9/21/16</a:t>
+              <a:t>10/7/16</a:t>
             </a:fld>
             <a:endParaRPr lang="en-US"/>
           </a:p>
@@ -4523,7 +4638,7 @@
           <p:nvPr/>
         </p:nvPicPr>
         <p:blipFill>
-          <a:blip r:embed="rId2"/>
+          <a:blip r:embed="rId3"/>
           <a:stretch>
             <a:fillRect/>
           </a:stretch>
@@ -4538,6 +4653,77 @@
           </a:prstGeom>
         </p:spPr>
       </p:pic>
+      <p:sp>
+        <p:nvSpPr>
+          <p:cNvPr id="5" name="TextBox 4"/>
+          <p:cNvSpPr txBox="1"/>
+          <p:nvPr/>
+        </p:nvSpPr>
+        <p:spPr>
+          <a:xfrm>
+            <a:off x="457200" y="5997594"/>
+            <a:ext cx="8347770" cy="923330"/>
+          </a:xfrm>
+          <a:prstGeom prst="rect">
+            <a:avLst/>
+          </a:prstGeom>
+          <a:noFill/>
+        </p:spPr>
+        <p:txBody>
+          <a:bodyPr wrap="none" rtlCol="0">
+            <a:spAutoFit/>
+          </a:bodyPr>
+          <a:lstStyle/>
+          <a:p>
+            <a:r>
+              <a:rPr lang="en-US" dirty="0" err="1"/>
+              <a:t>Weisstein</a:t>
+            </a:r>
+            <a:r>
+              <a:rPr lang="en-US" dirty="0"/>
+              <a:t>, Eric W. "Rabbit-Duck Illusion." From </a:t>
+            </a:r>
+            <a:r>
+              <a:rPr lang="en-US" dirty="0" err="1"/>
+              <a:t>MathWorld</a:t>
+            </a:r>
+            <a:r>
+              <a:rPr lang="en-US" dirty="0"/>
+              <a:t>--A Wolfram Web Resource</a:t>
+            </a:r>
+            <a:r>
+              <a:rPr lang="en-US" dirty="0" smtClean="0"/>
+              <a:t>.</a:t>
+            </a:r>
+          </a:p>
+          <a:p>
+            <a:r>
+              <a:rPr lang="en-US" dirty="0" smtClean="0"/>
+              <a:t> </a:t>
+            </a:r>
+            <a:r>
+              <a:rPr lang="en-US" dirty="0"/>
+              <a:t>http://</a:t>
+            </a:r>
+            <a:r>
+              <a:rPr lang="en-US" dirty="0" err="1"/>
+              <a:t>mathworld.wolfram.com</a:t>
+            </a:r>
+            <a:r>
+              <a:rPr lang="en-US" dirty="0"/>
+              <a:t>/Rabbit-</a:t>
+            </a:r>
+            <a:r>
+              <a:rPr lang="en-US" dirty="0" err="1"/>
+              <a:t>DuckIllusion.html</a:t>
+            </a:r>
+            <a:endParaRPr lang="en-US" dirty="0"/>
+          </a:p>
+          <a:p>
+            <a:endParaRPr lang="en-US" dirty="0"/>
+          </a:p>
+        </p:txBody>
+      </p:sp>
     </p:spTree>
     <p:extLst>
       <p:ext uri="{BB962C8B-B14F-4D97-AF65-F5344CB8AC3E}">

</xml_diff>